<commit_message>
"LoanerCoin" instead of "LoanCoin"
</commit_message>
<xml_diff>
--- a/LendCoin.pptx
+++ b/LendCoin.pptx
@@ -4206,7 +4206,7 @@
             </a:r>
             <a:r>
               <a:rPr lang="en-US" dirty="0" err="1"/>
-              <a:t>LenderCoin</a:t>
+              <a:t>LendCoin</a:t>
             </a:r>
             <a:endParaRPr lang="en-US" dirty="0"/>
           </a:p>
@@ -4315,7 +4315,7 @@
             </a:r>
             <a:r>
               <a:rPr lang="en-US" dirty="0" err="1"/>
-              <a:t>LenderCoin</a:t>
+              <a:t>LendCoin</a:t>
             </a:r>
             <a:endParaRPr lang="en-US" dirty="0"/>
           </a:p>
@@ -4475,7 +4475,7 @@
             </a:r>
             <a:r>
               <a:rPr lang="en-US" dirty="0" err="1"/>
-              <a:t>LenderCoin</a:t>
+              <a:t>LendCoin</a:t>
             </a:r>
             <a:r>
               <a:rPr lang="en-US" dirty="0"/>
@@ -5921,7 +5921,7 @@
             </a:r>
             <a:r>
               <a:rPr lang="en-US" dirty="0" err="1"/>
-              <a:t>LenderCoins</a:t>
+              <a:t>LendCoins</a:t>
             </a:r>
             <a:r>
               <a:rPr lang="en-US" dirty="0"/>
@@ -8869,15 +8869,6 @@
 </file>
 
 <file path=customXml/item2.xml><?xml version="1.0" encoding="utf-8"?>
-<?mso-contentType ?>
-<FormTemplates xmlns="http://schemas.microsoft.com/sharepoint/v3/contenttype/forms">
-  <Display>DocumentLibraryForm</Display>
-  <Edit>AssetEditForm</Edit>
-  <New>DocumentLibraryForm</New>
-</FormTemplates>
-</file>
-
-<file path=customXml/item3.xml><?xml version="1.0" encoding="utf-8"?>
 <p:properties xmlns:p="http://schemas.microsoft.com/office/2006/metadata/properties" xmlns:xsi="http://www.w3.org/2001/XMLSchema-instance" xmlns:pc="http://schemas.microsoft.com/office/infopath/2007/PartnerControls">
   <documentManagement>
     <DirectSourceMarket xmlns="4873beb7-5857-4685-be1f-d57550cc96cc" xsi:nil="true"/>
@@ -9003,6 +8994,15 @@
 </p:properties>
 </file>
 
+<file path=customXml/item3.xml><?xml version="1.0" encoding="utf-8"?>
+<?mso-contentType ?>
+<FormTemplates xmlns="http://schemas.microsoft.com/sharepoint/v3/contenttype/forms">
+  <Display>DocumentLibraryForm</Display>
+  <Edit>AssetEditForm</Edit>
+  <New>DocumentLibraryForm</New>
+</FormTemplates>
+</file>
+
 <file path=customXml/itemProps1.xml><?xml version="1.0" encoding="utf-8"?>
 <ds:datastoreItem xmlns:ds="http://schemas.openxmlformats.org/officeDocument/2006/customXml" ds:itemID="{0B5C6E15-39DC-470B-9445-F754B9458020}">
   <ds:schemaRefs>
@@ -9022,14 +9022,6 @@
 </file>
 
 <file path=customXml/itemProps2.xml><?xml version="1.0" encoding="utf-8"?>
-<ds:datastoreItem xmlns:ds="http://schemas.openxmlformats.org/officeDocument/2006/customXml" ds:itemID="{746CFF6F-D9AA-4BC0-911A-0A1356771912}">
-  <ds:schemaRefs>
-    <ds:schemaRef ds:uri="http://schemas.microsoft.com/sharepoint/v3/contenttype/forms"/>
-  </ds:schemaRefs>
-</ds:datastoreItem>
-</file>
-
-<file path=customXml/itemProps3.xml><?xml version="1.0" encoding="utf-8"?>
 <ds:datastoreItem xmlns:ds="http://schemas.openxmlformats.org/officeDocument/2006/customXml" ds:itemID="{04098515-0C12-46CF-BC7C-69B4A13CD5FA}">
   <ds:schemaRefs>
     <ds:schemaRef ds:uri="http://schemas.microsoft.com/office/2006/documentManagement/types"/>
@@ -9043,4 +9035,12 @@
     <ds:schemaRef ds:uri="4873beb7-5857-4685-be1f-d57550cc96cc"/>
   </ds:schemaRefs>
 </ds:datastoreItem>
+</file>
+
+<file path=customXml/itemProps3.xml><?xml version="1.0" encoding="utf-8"?>
+<ds:datastoreItem xmlns:ds="http://schemas.openxmlformats.org/officeDocument/2006/customXml" ds:itemID="{746CFF6F-D9AA-4BC0-911A-0A1356771912}">
+  <ds:schemaRefs>
+    <ds:schemaRef ds:uri="http://schemas.microsoft.com/sharepoint/v3/contenttype/forms"/>
+  </ds:schemaRefs>
+</ds:datastoreItem>
 </file>
</xml_diff>